<commit_message>
Skeleton for bot wiki in Jekyll
</commit_message>
<xml_diff>
--- a/specification/A hands-on approach on botnets.pptx
+++ b/specification/A hands-on approach on botnets.pptx
@@ -2115,8 +2115,8 @@
     <dgm:cxn modelId="{E4E0424E-28DA-47F2-A827-4E60E9380151}" srcId="{8C09421E-F61C-41CA-9B31-D8D937EF5B19}" destId="{109D5A0A-5512-4548-BEE5-09E72DD44CAC}" srcOrd="3" destOrd="0" parTransId="{008A27B0-E134-4783-8B96-543189FB15A7}" sibTransId="{29CBF864-F8FA-4E91-8AAB-4A2947041486}"/>
     <dgm:cxn modelId="{A467E7D3-2041-4650-B96E-346AFE380889}" type="presOf" srcId="{42D11E81-7413-4358-9E40-663A87166C94}" destId="{E12D2FE1-EF73-479F-A2D9-88A7B43746E0}" srcOrd="1" destOrd="0" presId="urn:microsoft.com/office/officeart/2005/8/layout/radial5"/>
     <dgm:cxn modelId="{8C3B7792-8D76-4EED-BAFE-2EF89B6937B9}" type="presOf" srcId="{CC3E7209-A339-4967-B9EF-987690DDF7B7}" destId="{ADEB2F0F-B018-4141-893A-F5D332A15701}" srcOrd="0" destOrd="0" presId="urn:microsoft.com/office/officeart/2005/8/layout/radial5"/>
+    <dgm:cxn modelId="{29FEC4BF-AFAB-4D39-8634-431525226A89}" srcId="{8C09421E-F61C-41CA-9B31-D8D937EF5B19}" destId="{CC3E7209-A339-4967-B9EF-987690DDF7B7}" srcOrd="4" destOrd="0" parTransId="{27A7A3A8-3852-484D-882A-1AADFCF9B498}" sibTransId="{A4AF8D97-CDFA-4AC6-BA19-F7559E80FEFB}"/>
     <dgm:cxn modelId="{F3896138-221C-4318-BC0D-1117A514558B}" type="presOf" srcId="{883E58D9-8529-4D2A-A7DA-478D29161726}" destId="{09E920D7-ECD8-4461-B740-A2C4D81420E4}" srcOrd="0" destOrd="0" presId="urn:microsoft.com/office/officeart/2005/8/layout/radial5"/>
-    <dgm:cxn modelId="{29FEC4BF-AFAB-4D39-8634-431525226A89}" srcId="{8C09421E-F61C-41CA-9B31-D8D937EF5B19}" destId="{CC3E7209-A339-4967-B9EF-987690DDF7B7}" srcOrd="4" destOrd="0" parTransId="{27A7A3A8-3852-484D-882A-1AADFCF9B498}" sibTransId="{A4AF8D97-CDFA-4AC6-BA19-F7559E80FEFB}"/>
     <dgm:cxn modelId="{CC2A0A7B-32FA-4CFE-83EC-CE554F89E9DD}" type="presOf" srcId="{27A7A3A8-3852-484D-882A-1AADFCF9B498}" destId="{84A0C371-E1ED-4590-AD8B-59F5A5A74207}" srcOrd="1" destOrd="0" presId="urn:microsoft.com/office/officeart/2005/8/layout/radial5"/>
     <dgm:cxn modelId="{8AB350B2-7FE1-4A5C-8011-4011DDDFDD26}" type="presOf" srcId="{109D5A0A-5512-4548-BEE5-09E72DD44CAC}" destId="{CEA2B6C8-BA08-499E-9728-4179797FFD34}" srcOrd="0" destOrd="0" presId="urn:microsoft.com/office/officeart/2005/8/layout/radial5"/>
     <dgm:cxn modelId="{5CB6615B-50D6-4959-B423-765A2803741D}" type="presOf" srcId="{42D11E81-7413-4358-9E40-663A87166C94}" destId="{92A1D697-D03C-4A75-B3F7-75FDB539F5B3}" srcOrd="0" destOrd="0" presId="urn:microsoft.com/office/officeart/2005/8/layout/radial5"/>
@@ -2352,6 +2352,13 @@
         </dgm:presLayoutVars>
       </dgm:prSet>
       <dgm:spPr/>
+      <dgm:t>
+        <a:bodyPr/>
+        <a:lstStyle/>
+        <a:p>
+          <a:endParaRPr lang="en-US"/>
+        </a:p>
+      </dgm:t>
     </dgm:pt>
     <dgm:pt modelId="{F8BC7247-B26C-4ED2-842E-19A2DCD06FFF}" type="pres">
       <dgm:prSet presAssocID="{0F1B3C37-A765-4AD9-9FE6-2F30A1A68839}" presName="rect1" presStyleLbl="lnNode1" presStyleIdx="0" presStyleCnt="4"/>
@@ -2379,6 +2386,13 @@
         </dgm:presLayoutVars>
       </dgm:prSet>
       <dgm:spPr/>
+      <dgm:t>
+        <a:bodyPr/>
+        <a:lstStyle/>
+        <a:p>
+          <a:endParaRPr lang="en-US"/>
+        </a:p>
+      </dgm:t>
     </dgm:pt>
     <dgm:pt modelId="{8A034844-46B6-48F5-800C-F26B90C84CD8}" type="pres">
       <dgm:prSet presAssocID="{D83C7369-7612-464B-961D-90B60194DACC}" presName="rect1" presStyleLbl="lnNode1" presStyleIdx="1" presStyleCnt="4"/>
@@ -2406,6 +2420,13 @@
         </dgm:presLayoutVars>
       </dgm:prSet>
       <dgm:spPr/>
+      <dgm:t>
+        <a:bodyPr/>
+        <a:lstStyle/>
+        <a:p>
+          <a:endParaRPr lang="en-US"/>
+        </a:p>
+      </dgm:t>
     </dgm:pt>
     <dgm:pt modelId="{B08EEDE7-85A3-4B21-9997-EA56A6E50C52}" type="pres">
       <dgm:prSet presAssocID="{675D3397-3AB1-453C-9D7F-328210709169}" presName="rect1" presStyleLbl="lnNode1" presStyleIdx="2" presStyleCnt="4"/>
@@ -2433,6 +2454,13 @@
         </dgm:presLayoutVars>
       </dgm:prSet>
       <dgm:spPr/>
+      <dgm:t>
+        <a:bodyPr/>
+        <a:lstStyle/>
+        <a:p>
+          <a:endParaRPr lang="en-US"/>
+        </a:p>
+      </dgm:t>
     </dgm:pt>
     <dgm:pt modelId="{FD622069-6B11-4E82-ACD1-D816A6837B75}" type="pres">
       <dgm:prSet presAssocID="{DE2F24B1-3656-41CA-B9AD-87D3FFA2514F}" presName="rect1" presStyleLbl="lnNode1" presStyleIdx="3" presStyleCnt="4"/>
@@ -10954,24 +10982,20 @@
           <a:p>
             <a:r>
               <a:rPr lang="pt-PT" dirty="0" smtClean="0"/>
-              <a:t>Thank you</a:t>
+              <a:t>Thank you!</a:t>
             </a:r>
+          </a:p>
+          <a:p>
+            <a:endParaRPr lang="en-US" dirty="0"/>
+          </a:p>
+          <a:p>
             <a:r>
-              <a:rPr lang="pt-PT" dirty="0" smtClean="0"/>
-              <a:t>!</a:t>
-            </a:r>
-          </a:p>
-          <a:p>
-            <a:endParaRPr lang="en-US" dirty="0"/>
-          </a:p>
-          <a:p>
-            <a:r>
-              <a:rPr lang="en-US" dirty="0" err="1" smtClean="0"/>
-              <a:t>Gruop</a:t>
+              <a:rPr lang="en-US" dirty="0" smtClean="0"/>
+              <a:t>Group </a:t>
             </a:r>
             <a:r>
               <a:rPr lang="en-US" dirty="0" smtClean="0"/>
-              <a:t> 6 – Theme 12</a:t>
+              <a:t>6 – Theme 12</a:t>
             </a:r>
             <a:endParaRPr lang="pt-PT" dirty="0"/>
           </a:p>
@@ -11224,7 +11248,6 @@
               <a:rPr lang="pt-PT" dirty="0"/>
               <a:t>(ei11142@fe.up.pt)</a:t>
             </a:r>
-            <a:endParaRPr lang="pt-PT" dirty="0"/>
           </a:p>
         </p:txBody>
       </p:sp>

</xml_diff>

<commit_message>
added keylogger function - working beautifuly
</commit_message>
<xml_diff>
--- a/specification/A hands-on approach on botnets.pptx
+++ b/specification/A hands-on approach on botnets.pptx
@@ -5,16 +5,17 @@
     <p:sldMasterId id="2147484259" r:id="rId1"/>
   </p:sldMasterIdLst>
   <p:notesMasterIdLst>
-    <p:notesMasterId r:id="rId9"/>
+    <p:notesMasterId r:id="rId10"/>
   </p:notesMasterIdLst>
   <p:sldIdLst>
     <p:sldId id="256" r:id="rId2"/>
     <p:sldId id="257" r:id="rId3"/>
     <p:sldId id="260" r:id="rId4"/>
-    <p:sldId id="266" r:id="rId5"/>
-    <p:sldId id="262" r:id="rId6"/>
-    <p:sldId id="264" r:id="rId7"/>
-    <p:sldId id="259" r:id="rId8"/>
+    <p:sldId id="268" r:id="rId5"/>
+    <p:sldId id="266" r:id="rId6"/>
+    <p:sldId id="262" r:id="rId7"/>
+    <p:sldId id="264" r:id="rId8"/>
+    <p:sldId id="259" r:id="rId9"/>
   </p:sldIdLst>
   <p:sldSz cx="12192000" cy="6858000"/>
   <p:notesSz cx="6858000" cy="9144000"/>
@@ -6843,7 +6844,7 @@
           <a:p>
             <a:fld id="{D53CEB6E-A33F-4E49-B64C-131A700B84D4}" type="slidenum">
               <a:rPr lang="pt-PT" smtClean="0"/>
-              <a:t>5</a:t>
+              <a:t>6</a:t>
             </a:fld>
             <a:endParaRPr lang="pt-PT"/>
           </a:p>
@@ -10615,6 +10616,325 @@
       </p:grpSpPr>
       <p:sp>
         <p:nvSpPr>
+          <p:cNvPr id="2" name="Title 1"/>
+          <p:cNvSpPr>
+            <a:spLocks noGrp="1"/>
+          </p:cNvSpPr>
+          <p:nvPr>
+            <p:ph type="title"/>
+          </p:nvPr>
+        </p:nvSpPr>
+        <p:spPr/>
+        <p:txBody>
+          <a:bodyPr/>
+          <a:lstStyle/>
+          <a:p>
+            <a:r>
+              <a:rPr lang="pt-PT" dirty="0"/>
+              <a:t>ZeroAccess </a:t>
+            </a:r>
+            <a:r>
+              <a:rPr lang="pt-PT" dirty="0" smtClean="0"/>
+              <a:t>botnet example</a:t>
+            </a:r>
+            <a:endParaRPr lang="pt-PT" dirty="0"/>
+          </a:p>
+        </p:txBody>
+      </p:sp>
+      <p:pic>
+        <p:nvPicPr>
+          <p:cNvPr id="5" name="Picture 4"/>
+          <p:cNvPicPr>
+            <a:picLocks noChangeAspect="1"/>
+          </p:cNvPicPr>
+          <p:nvPr/>
+        </p:nvPicPr>
+        <p:blipFill rotWithShape="1">
+          <a:blip r:embed="rId2">
+            <a:extLst>
+              <a:ext uri="{28A0092B-C50C-407E-A947-70E740481C1C}">
+                <a14:useLocalDpi xmlns:a14="http://schemas.microsoft.com/office/drawing/2010/main" val="0"/>
+              </a:ext>
+            </a:extLst>
+          </a:blip>
+          <a:srcRect t="9284" b="9823"/>
+          <a:stretch/>
+        </p:blipFill>
+        <p:spPr>
+          <a:xfrm>
+            <a:off x="46297" y="1967692"/>
+            <a:ext cx="6065067" cy="3685104"/>
+          </a:xfrm>
+          <a:prstGeom prst="rect">
+            <a:avLst/>
+          </a:prstGeom>
+        </p:spPr>
+      </p:pic>
+      <p:pic>
+        <p:nvPicPr>
+          <p:cNvPr id="6" name="Picture 5"/>
+          <p:cNvPicPr>
+            <a:picLocks noChangeAspect="1"/>
+          </p:cNvPicPr>
+          <p:nvPr/>
+        </p:nvPicPr>
+        <p:blipFill rotWithShape="1">
+          <a:blip r:embed="rId3">
+            <a:extLst>
+              <a:ext uri="{28A0092B-C50C-407E-A947-70E740481C1C}">
+                <a14:useLocalDpi xmlns:a14="http://schemas.microsoft.com/office/drawing/2010/main" val="0"/>
+              </a:ext>
+            </a:extLst>
+          </a:blip>
+          <a:srcRect t="9642" b="9824"/>
+          <a:stretch/>
+        </p:blipFill>
+        <p:spPr>
+          <a:xfrm>
+            <a:off x="6065066" y="1967692"/>
+            <a:ext cx="6092142" cy="3685105"/>
+          </a:xfrm>
+          <a:prstGeom prst="rect">
+            <a:avLst/>
+          </a:prstGeom>
+        </p:spPr>
+      </p:pic>
+      <p:sp>
+        <p:nvSpPr>
+          <p:cNvPr id="7" name="Text Placeholder 3"/>
+          <p:cNvSpPr txBox="1">
+            <a:spLocks/>
+          </p:cNvSpPr>
+          <p:nvPr/>
+        </p:nvSpPr>
+        <p:spPr>
+          <a:xfrm>
+            <a:off x="2066925" y="5722714"/>
+            <a:ext cx="10090729" cy="412906"/>
+          </a:xfrm>
+          <a:prstGeom prst="rect">
+            <a:avLst/>
+          </a:prstGeom>
+        </p:spPr>
+        <p:txBody>
+          <a:bodyPr vert="horz" lIns="91440" tIns="45720" rIns="91440" bIns="45720" rtlCol="0">
+            <a:normAutofit fontScale="92500" lnSpcReduction="10000"/>
+          </a:bodyPr>
+          <a:lstStyle>
+            <a:lvl1pPr marL="228600" indent="-228600" algn="l" defTabSz="914400" rtl="0" eaLnBrk="1" latinLnBrk="0" hangingPunct="1">
+              <a:lnSpc>
+                <a:spcPct val="90000"/>
+              </a:lnSpc>
+              <a:spcBef>
+                <a:spcPts val="1000"/>
+              </a:spcBef>
+              <a:buFont typeface="Wingdings 2" pitchFamily="18" charset="2"/>
+              <a:buChar char=""/>
+              <a:defRPr sz="2800" kern="1200">
+                <a:solidFill>
+                  <a:schemeClr val="tx1"/>
+                </a:solidFill>
+                <a:latin typeface="+mn-lt"/>
+                <a:ea typeface="+mn-ea"/>
+                <a:cs typeface="+mn-cs"/>
+              </a:defRPr>
+            </a:lvl1pPr>
+            <a:lvl2pPr marL="685800" indent="-228600" algn="l" defTabSz="914400" rtl="0" eaLnBrk="1" latinLnBrk="0" hangingPunct="1">
+              <a:lnSpc>
+                <a:spcPct val="90000"/>
+              </a:lnSpc>
+              <a:spcBef>
+                <a:spcPts val="500"/>
+              </a:spcBef>
+              <a:buFont typeface="Wingdings 2" pitchFamily="18" charset="2"/>
+              <a:buChar char=""/>
+              <a:defRPr sz="2400" kern="1200">
+                <a:solidFill>
+                  <a:schemeClr val="tx1"/>
+                </a:solidFill>
+                <a:latin typeface="+mn-lt"/>
+                <a:ea typeface="+mn-ea"/>
+                <a:cs typeface="+mn-cs"/>
+              </a:defRPr>
+            </a:lvl2pPr>
+            <a:lvl3pPr marL="1143000" indent="-228600" algn="l" defTabSz="914400" rtl="0" eaLnBrk="1" latinLnBrk="0" hangingPunct="1">
+              <a:lnSpc>
+                <a:spcPct val="90000"/>
+              </a:lnSpc>
+              <a:spcBef>
+                <a:spcPts val="500"/>
+              </a:spcBef>
+              <a:buFont typeface="Wingdings 2" pitchFamily="18" charset="2"/>
+              <a:buChar char=""/>
+              <a:defRPr sz="2000" kern="1200">
+                <a:solidFill>
+                  <a:schemeClr val="tx1"/>
+                </a:solidFill>
+                <a:latin typeface="+mn-lt"/>
+                <a:ea typeface="+mn-ea"/>
+                <a:cs typeface="+mn-cs"/>
+              </a:defRPr>
+            </a:lvl3pPr>
+            <a:lvl4pPr marL="1600200" indent="-228600" algn="l" defTabSz="914400" rtl="0" eaLnBrk="1" latinLnBrk="0" hangingPunct="1">
+              <a:lnSpc>
+                <a:spcPct val="90000"/>
+              </a:lnSpc>
+              <a:spcBef>
+                <a:spcPts val="500"/>
+              </a:spcBef>
+              <a:buFont typeface="Wingdings 2" pitchFamily="18" charset="2"/>
+              <a:buChar char=""/>
+              <a:defRPr sz="1800" kern="1200">
+                <a:solidFill>
+                  <a:schemeClr val="tx1"/>
+                </a:solidFill>
+                <a:latin typeface="+mn-lt"/>
+                <a:ea typeface="+mn-ea"/>
+                <a:cs typeface="+mn-cs"/>
+              </a:defRPr>
+            </a:lvl4pPr>
+            <a:lvl5pPr marL="2057400" indent="-228600" algn="l" defTabSz="914400" rtl="0" eaLnBrk="1" latinLnBrk="0" hangingPunct="1">
+              <a:lnSpc>
+                <a:spcPct val="90000"/>
+              </a:lnSpc>
+              <a:spcBef>
+                <a:spcPts val="500"/>
+              </a:spcBef>
+              <a:buFont typeface="Wingdings 2" pitchFamily="18" charset="2"/>
+              <a:buChar char=""/>
+              <a:defRPr sz="1800" kern="1200">
+                <a:solidFill>
+                  <a:schemeClr val="tx1"/>
+                </a:solidFill>
+                <a:latin typeface="+mn-lt"/>
+                <a:ea typeface="+mn-ea"/>
+                <a:cs typeface="+mn-cs"/>
+              </a:defRPr>
+            </a:lvl5pPr>
+            <a:lvl6pPr marL="2514600" indent="-228600" algn="l" defTabSz="914400" rtl="0" eaLnBrk="1" latinLnBrk="0" hangingPunct="1">
+              <a:spcBef>
+                <a:spcPct val="20000"/>
+              </a:spcBef>
+              <a:buFont typeface="Wingdings 2" pitchFamily="18" charset="2"/>
+              <a:buChar char=""/>
+              <a:defRPr sz="1800" kern="1200">
+                <a:solidFill>
+                  <a:schemeClr val="tx1"/>
+                </a:solidFill>
+                <a:latin typeface="+mn-lt"/>
+                <a:ea typeface="+mn-ea"/>
+                <a:cs typeface="+mn-cs"/>
+              </a:defRPr>
+            </a:lvl6pPr>
+            <a:lvl7pPr marL="2971800" indent="-228600" algn="l" defTabSz="914400" rtl="0" eaLnBrk="1" latinLnBrk="0" hangingPunct="1">
+              <a:spcBef>
+                <a:spcPct val="20000"/>
+              </a:spcBef>
+              <a:buFont typeface="Wingdings 2" pitchFamily="18" charset="2"/>
+              <a:buChar char=""/>
+              <a:defRPr sz="1800" kern="1200">
+                <a:solidFill>
+                  <a:schemeClr val="tx1"/>
+                </a:solidFill>
+                <a:latin typeface="+mn-lt"/>
+                <a:ea typeface="+mn-ea"/>
+                <a:cs typeface="+mn-cs"/>
+              </a:defRPr>
+            </a:lvl7pPr>
+            <a:lvl8pPr marL="3429000" indent="-228600" algn="l" defTabSz="914400" rtl="0" eaLnBrk="1" latinLnBrk="0" hangingPunct="1">
+              <a:spcBef>
+                <a:spcPct val="20000"/>
+              </a:spcBef>
+              <a:buFont typeface="Wingdings 2" pitchFamily="18" charset="2"/>
+              <a:buChar char=""/>
+              <a:defRPr sz="1800" kern="1200">
+                <a:solidFill>
+                  <a:schemeClr val="tx1"/>
+                </a:solidFill>
+                <a:latin typeface="+mn-lt"/>
+                <a:ea typeface="+mn-ea"/>
+                <a:cs typeface="+mn-cs"/>
+              </a:defRPr>
+            </a:lvl8pPr>
+            <a:lvl9pPr marL="3886200" indent="-228600" algn="l" defTabSz="914400" rtl="0" eaLnBrk="1" latinLnBrk="0" hangingPunct="1">
+              <a:spcBef>
+                <a:spcPct val="20000"/>
+              </a:spcBef>
+              <a:buFont typeface="Wingdings 2" pitchFamily="18" charset="2"/>
+              <a:buChar char=""/>
+              <a:defRPr sz="1800" kern="1200">
+                <a:solidFill>
+                  <a:schemeClr val="tx1"/>
+                </a:solidFill>
+                <a:latin typeface="+mn-lt"/>
+                <a:ea typeface="+mn-ea"/>
+                <a:cs typeface="+mn-cs"/>
+              </a:defRPr>
+            </a:lvl9pPr>
+          </a:lstStyle>
+          <a:p>
+            <a:r>
+              <a:rPr lang="en-US" dirty="0" smtClean="0"/>
+              <a:t>F-Secure - </a:t>
+            </a:r>
+            <a:r>
+              <a:rPr lang="en-US" i="1" dirty="0" smtClean="0"/>
+              <a:t>The </a:t>
+            </a:r>
+            <a:r>
+              <a:rPr lang="en-US" i="1" dirty="0" err="1"/>
+              <a:t>ZeroAccess</a:t>
+            </a:r>
+            <a:r>
+              <a:rPr lang="en-US" i="1" dirty="0"/>
+              <a:t> Botnet </a:t>
+            </a:r>
+            <a:r>
+              <a:rPr lang="en-US" i="1" dirty="0" smtClean="0"/>
+              <a:t>visualized </a:t>
+            </a:r>
+            <a:r>
+              <a:rPr lang="en-US" i="1" dirty="0"/>
+              <a:t>on Google Earth</a:t>
+            </a:r>
+          </a:p>
+          <a:p>
+            <a:endParaRPr lang="pt-PT" dirty="0" smtClean="0"/>
+          </a:p>
+        </p:txBody>
+      </p:sp>
+    </p:spTree>
+    <p:extLst>
+      <p:ext uri="{BB962C8B-B14F-4D97-AF65-F5344CB8AC3E}">
+        <p14:creationId xmlns:p14="http://schemas.microsoft.com/office/powerpoint/2010/main" val="3785537066"/>
+      </p:ext>
+    </p:extLst>
+  </p:cSld>
+  <p:clrMapOvr>
+    <a:masterClrMapping/>
+  </p:clrMapOvr>
+</p:sld>
+</file>
+
+<file path=ppt/slides/slide5.xml><?xml version="1.0" encoding="utf-8"?>
+<p:sld xmlns:a="http://schemas.openxmlformats.org/drawingml/2006/main" xmlns:r="http://schemas.openxmlformats.org/officeDocument/2006/relationships" xmlns:p="http://schemas.openxmlformats.org/presentationml/2006/main">
+  <p:cSld>
+    <p:spTree>
+      <p:nvGrpSpPr>
+        <p:cNvPr id="1" name=""/>
+        <p:cNvGrpSpPr/>
+        <p:nvPr/>
+      </p:nvGrpSpPr>
+      <p:grpSpPr>
+        <a:xfrm>
+          <a:off x="0" y="0"/>
+          <a:ext cx="0" cy="0"/>
+          <a:chOff x="0" y="0"/>
+          <a:chExt cx="0" cy="0"/>
+        </a:xfrm>
+      </p:grpSpPr>
+      <p:sp>
+        <p:nvSpPr>
           <p:cNvPr id="6" name="Title 1"/>
           <p:cNvSpPr txBox="1">
             <a:spLocks/>
@@ -10712,7 +11032,7 @@
 </p:sld>
 </file>
 
-<file path=ppt/slides/slide5.xml><?xml version="1.0" encoding="utf-8"?>
+<file path=ppt/slides/slide6.xml><?xml version="1.0" encoding="utf-8"?>
 <p:sld xmlns:a="http://schemas.openxmlformats.org/drawingml/2006/main" xmlns:r="http://schemas.openxmlformats.org/officeDocument/2006/relationships" xmlns:p="http://schemas.openxmlformats.org/presentationml/2006/main">
   <p:cSld>
     <p:spTree>
@@ -10826,7 +11146,7 @@
 </p:sld>
 </file>
 
-<file path=ppt/slides/slide6.xml><?xml version="1.0" encoding="utf-8"?>
+<file path=ppt/slides/slide7.xml><?xml version="1.0" encoding="utf-8"?>
 <p:sld xmlns:a="http://schemas.openxmlformats.org/drawingml/2006/main" xmlns:r="http://schemas.openxmlformats.org/officeDocument/2006/relationships" xmlns:p="http://schemas.openxmlformats.org/presentationml/2006/main">
   <p:cSld>
     <p:spTree>
@@ -10941,7 +11261,7 @@
 </p:sld>
 </file>
 
-<file path=ppt/slides/slide7.xml><?xml version="1.0" encoding="utf-8"?>
+<file path=ppt/slides/slide8.xml><?xml version="1.0" encoding="utf-8"?>
 <p:sld xmlns:a="http://schemas.openxmlformats.org/drawingml/2006/main" xmlns:r="http://schemas.openxmlformats.org/officeDocument/2006/relationships" xmlns:p="http://schemas.openxmlformats.org/presentationml/2006/main">
   <p:cSld>
     <p:spTree>

</xml_diff>